<commit_message>
Updated license and agenda files for 2021-03-25 tutorial at ISS
</commit_message>
<xml_diff>
--- a/license-master.pptx
+++ b/license-master.pptx
@@ -255,7 +255,7 @@
           <a:p>
             <a:fld id="{0B842F42-2CE9-4E35-95C1-410DC08A50B1}" type="datetimeFigureOut">
               <a:rPr lang="en-US" smtClean="0"/>
-              <a:t>9/28/2020</a:t>
+              <a:t>3/21/2021</a:t>
             </a:fld>
             <a:endParaRPr lang="en-US"/>
           </a:p>
@@ -420,7 +420,7 @@
           <a:p>
             <a:fld id="{6F282904-F315-4730-8D91-37D99E141A6F}" type="datetimeFigureOut">
               <a:rPr lang="en-US" smtClean="0"/>
-              <a:t>9/28/2020</a:t>
+              <a:t>3/21/2021</a:t>
             </a:fld>
             <a:endParaRPr lang="en-US"/>
           </a:p>
@@ -3629,13 +3629,13 @@
             </a:pPr>
             <a:r>
               <a:rPr lang="en-US" sz="1600" b="1" dirty="0"/>
-              <a:t>The requested citation the overall tutorial is: David E. Bernholdt, Anshu Dubey, Patricia A. Grubel, Rinku K. Gupta, Better Scientific Software tutorial, in SC ‘20: International Conference for High Performance Computing, Networking, Storage and Analysis, online, 2020. DOI: </a:t>
+              <a:t>The requested citation the overall tutorial is: David E. Bernholdt, Anshu Dubey, Rinku K. Gupta, and David M. Rogers, Better Scientific Software tutorial, in Improving Scientific Software conference, online, 2021. DOI: </a:t>
             </a:r>
             <a:r>
               <a:rPr lang="en-US" sz="1600" b="1" dirty="0">
                 <a:hlinkClick r:id="rId4"/>
               </a:rPr>
-              <a:t>10.6084/m9.figshare.12994376</a:t>
+              <a:t>10.6084/m9.figshare.14256257</a:t>
             </a:r>
             <a:endParaRPr lang="en-US" sz="1600" b="1" dirty="0"/>
           </a:p>
@@ -4764,9 +4764,12 @@
 </file>
 
 <file path=customXml/item1.xml><?xml version="1.0" encoding="utf-8"?>
-<p:properties xmlns:p="http://schemas.microsoft.com/office/2006/metadata/properties" xmlns:xsi="http://www.w3.org/2001/XMLSchema-instance" xmlns:pc="http://schemas.microsoft.com/office/infopath/2007/PartnerControls">
-  <documentManagement/>
-</p:properties>
+<?mso-contentType ?>
+<FormTemplates xmlns="http://schemas.microsoft.com/sharepoint/v3/contenttype/forms">
+  <Display>DocumentLibraryForm</Display>
+  <Edit>DocumentLibraryForm</Edit>
+  <New>DocumentLibraryForm</New>
+</FormTemplates>
 </file>
 
 <file path=customXml/item2.xml><?xml version="1.0" encoding="utf-8"?>
@@ -4819,25 +4822,15 @@
 </file>
 
 <file path=customXml/item3.xml><?xml version="1.0" encoding="utf-8"?>
-<?mso-contentType ?>
-<FormTemplates xmlns="http://schemas.microsoft.com/sharepoint/v3/contenttype/forms">
-  <Display>DocumentLibraryForm</Display>
-  <Edit>DocumentLibraryForm</Edit>
-  <New>DocumentLibraryForm</New>
-</FormTemplates>
+<p:properties xmlns:p="http://schemas.microsoft.com/office/2006/metadata/properties" xmlns:xsi="http://www.w3.org/2001/XMLSchema-instance" xmlns:pc="http://schemas.microsoft.com/office/infopath/2007/PartnerControls">
+  <documentManagement/>
+</p:properties>
 </file>
 
 <file path=customXml/itemProps1.xml><?xml version="1.0" encoding="utf-8"?>
-<ds:datastoreItem xmlns:ds="http://schemas.openxmlformats.org/officeDocument/2006/customXml" ds:itemID="{A50EC660-24D0-43A0-AE5E-E274115E726B}">
+<ds:datastoreItem xmlns:ds="http://schemas.openxmlformats.org/officeDocument/2006/customXml" ds:itemID="{19E20559-B232-4371-8690-E3D8007EDB82}">
   <ds:schemaRefs>
-    <ds:schemaRef ds:uri="http://purl.org/dc/elements/1.1/"/>
-    <ds:schemaRef ds:uri="http://schemas.microsoft.com/office/2006/metadata/properties"/>
-    <ds:schemaRef ds:uri="http://purl.org/dc/terms/"/>
-    <ds:schemaRef ds:uri="http://schemas.openxmlformats.org/package/2006/metadata/core-properties"/>
-    <ds:schemaRef ds:uri="http://schemas.microsoft.com/office/2006/documentManagement/types"/>
-    <ds:schemaRef ds:uri="http://www.w3.org/XML/1998/namespace"/>
-    <ds:schemaRef ds:uri="http://purl.org/dc/dcmitype/"/>
-    <ds:schemaRef ds:uri="http://schemas.microsoft.com/office/infopath/2007/PartnerControls"/>
+    <ds:schemaRef ds:uri="http://schemas.microsoft.com/sharepoint/v3/contenttype/forms"/>
   </ds:schemaRefs>
 </ds:datastoreItem>
 </file>
@@ -4858,9 +4851,16 @@
 </file>
 
 <file path=customXml/itemProps3.xml><?xml version="1.0" encoding="utf-8"?>
-<ds:datastoreItem xmlns:ds="http://schemas.openxmlformats.org/officeDocument/2006/customXml" ds:itemID="{19E20559-B232-4371-8690-E3D8007EDB82}">
+<ds:datastoreItem xmlns:ds="http://schemas.openxmlformats.org/officeDocument/2006/customXml" ds:itemID="{A50EC660-24D0-43A0-AE5E-E274115E726B}">
   <ds:schemaRefs>
-    <ds:schemaRef ds:uri="http://schemas.microsoft.com/sharepoint/v3/contenttype/forms"/>
+    <ds:schemaRef ds:uri="http://purl.org/dc/elements/1.1/"/>
+    <ds:schemaRef ds:uri="http://schemas.microsoft.com/office/2006/metadata/properties"/>
+    <ds:schemaRef ds:uri="http://purl.org/dc/terms/"/>
+    <ds:schemaRef ds:uri="http://schemas.openxmlformats.org/package/2006/metadata/core-properties"/>
+    <ds:schemaRef ds:uri="http://schemas.microsoft.com/office/2006/documentManagement/types"/>
+    <ds:schemaRef ds:uri="http://www.w3.org/XML/1998/namespace"/>
+    <ds:schemaRef ds:uri="http://purl.org/dc/dcmitype/"/>
+    <ds:schemaRef ds:uri="http://schemas.microsoft.com/office/infopath/2007/PartnerControls"/>
   </ds:schemaRefs>
 </ds:datastoreItem>
 </file>
</xml_diff>

<commit_message>
Update agenda and license master slides for ECP AM tutorial
</commit_message>
<xml_diff>
--- a/license-master.pptx
+++ b/license-master.pptx
@@ -255,7 +255,7 @@
           <a:p>
             <a:fld id="{0B842F42-2CE9-4E35-95C1-410DC08A50B1}" type="datetimeFigureOut">
               <a:rPr lang="en-US" smtClean="0"/>
-              <a:t>3/21/2021</a:t>
+              <a:t>4/6/2021</a:t>
             </a:fld>
             <a:endParaRPr lang="en-US"/>
           </a:p>
@@ -420,7 +420,7 @@
           <a:p>
             <a:fld id="{6F282904-F315-4730-8D91-37D99E141A6F}" type="datetimeFigureOut">
               <a:rPr lang="en-US" smtClean="0"/>
-              <a:t>3/21/2021</a:t>
+              <a:t>4/6/2021</a:t>
             </a:fld>
             <a:endParaRPr lang="en-US"/>
           </a:p>
@@ -3629,13 +3629,29 @@
             </a:pPr>
             <a:r>
               <a:rPr lang="en-US" sz="1600" b="1" dirty="0"/>
-              <a:t>The requested citation the overall tutorial is: David E. Bernholdt, Anshu Dubey, Rinku K. Gupta, and David M. Rogers, Better Scientific Software tutorial, in Improving Scientific Software conference, online, 2021. DOI: </a:t>
+              <a:t>The requested citation the overall tutorial is: David E. Bernholdt, Patricia A. Grubel, and James M. </a:t>
+            </a:r>
+            <a:r>
+              <a:rPr lang="en-US" sz="1600" b="1" dirty="0" err="1"/>
+              <a:t>Willenbring</a:t>
+            </a:r>
+            <a:r>
+              <a:rPr lang="en-US" sz="1600" b="1" dirty="0"/>
+              <a:t>, Developing a Testing and Continuous Integration Strategy for your Team tutorial, in </a:t>
+            </a:r>
+            <a:r>
+              <a:rPr lang="en-US" sz="1600" b="1" dirty="0" err="1"/>
+              <a:t>Exascale</a:t>
+            </a:r>
+            <a:r>
+              <a:rPr lang="en-US" sz="1600" b="1" dirty="0"/>
+              <a:t> Computing Project Annual Meeting, online, 2021. DOI: </a:t>
             </a:r>
             <a:r>
               <a:rPr lang="en-US" sz="1600" b="1" dirty="0">
                 <a:hlinkClick r:id="rId4"/>
               </a:rPr>
-              <a:t>10.6084/m9.figshare.14256257</a:t>
+              <a:t>10.6084/m9.figshare.14376956</a:t>
             </a:r>
             <a:endParaRPr lang="en-US" sz="1600" b="1" dirty="0"/>
           </a:p>
@@ -3678,15 +3694,7 @@
             </a:pPr>
             <a:r>
               <a:rPr lang="en-US" sz="1400" dirty="0"/>
-              <a:t>Additional contributors include: Mike </a:t>
-            </a:r>
-            <a:r>
-              <a:rPr lang="en-US" sz="1400" dirty="0" err="1"/>
-              <a:t>Heroux</a:t>
-            </a:r>
-            <a:r>
-              <a:rPr lang="en-US" sz="1400" dirty="0"/>
-              <a:t>, Alicia </a:t>
+              <a:t>Additional contributors include: David E. Bernholdt, Anshu Dubey, Rinku K. Gupta, Mike Heroux, Alicia </a:t>
             </a:r>
             <a:r>
               <a:rPr lang="en-US" sz="1400" dirty="0" err="1"/>
@@ -4764,12 +4772,9 @@
 </file>
 
 <file path=customXml/item1.xml><?xml version="1.0" encoding="utf-8"?>
-<?mso-contentType ?>
-<FormTemplates xmlns="http://schemas.microsoft.com/sharepoint/v3/contenttype/forms">
-  <Display>DocumentLibraryForm</Display>
-  <Edit>DocumentLibraryForm</Edit>
-  <New>DocumentLibraryForm</New>
-</FormTemplates>
+<p:properties xmlns:p="http://schemas.microsoft.com/office/2006/metadata/properties" xmlns:xsi="http://www.w3.org/2001/XMLSchema-instance" xmlns:pc="http://schemas.microsoft.com/office/infopath/2007/PartnerControls">
+  <documentManagement/>
+</p:properties>
 </file>
 
 <file path=customXml/item2.xml><?xml version="1.0" encoding="utf-8"?>
@@ -4822,15 +4827,25 @@
 </file>
 
 <file path=customXml/item3.xml><?xml version="1.0" encoding="utf-8"?>
-<p:properties xmlns:p="http://schemas.microsoft.com/office/2006/metadata/properties" xmlns:xsi="http://www.w3.org/2001/XMLSchema-instance" xmlns:pc="http://schemas.microsoft.com/office/infopath/2007/PartnerControls">
-  <documentManagement/>
-</p:properties>
+<?mso-contentType ?>
+<FormTemplates xmlns="http://schemas.microsoft.com/sharepoint/v3/contenttype/forms">
+  <Display>DocumentLibraryForm</Display>
+  <Edit>DocumentLibraryForm</Edit>
+  <New>DocumentLibraryForm</New>
+</FormTemplates>
 </file>
 
 <file path=customXml/itemProps1.xml><?xml version="1.0" encoding="utf-8"?>
-<ds:datastoreItem xmlns:ds="http://schemas.openxmlformats.org/officeDocument/2006/customXml" ds:itemID="{19E20559-B232-4371-8690-E3D8007EDB82}">
+<ds:datastoreItem xmlns:ds="http://schemas.openxmlformats.org/officeDocument/2006/customXml" ds:itemID="{A50EC660-24D0-43A0-AE5E-E274115E726B}">
   <ds:schemaRefs>
-    <ds:schemaRef ds:uri="http://schemas.microsoft.com/sharepoint/v3/contenttype/forms"/>
+    <ds:schemaRef ds:uri="http://purl.org/dc/elements/1.1/"/>
+    <ds:schemaRef ds:uri="http://schemas.microsoft.com/office/2006/metadata/properties"/>
+    <ds:schemaRef ds:uri="http://purl.org/dc/terms/"/>
+    <ds:schemaRef ds:uri="http://schemas.openxmlformats.org/package/2006/metadata/core-properties"/>
+    <ds:schemaRef ds:uri="http://schemas.microsoft.com/office/2006/documentManagement/types"/>
+    <ds:schemaRef ds:uri="http://www.w3.org/XML/1998/namespace"/>
+    <ds:schemaRef ds:uri="http://purl.org/dc/dcmitype/"/>
+    <ds:schemaRef ds:uri="http://schemas.microsoft.com/office/infopath/2007/PartnerControls"/>
   </ds:schemaRefs>
 </ds:datastoreItem>
 </file>
@@ -4851,16 +4866,9 @@
 </file>
 
 <file path=customXml/itemProps3.xml><?xml version="1.0" encoding="utf-8"?>
-<ds:datastoreItem xmlns:ds="http://schemas.openxmlformats.org/officeDocument/2006/customXml" ds:itemID="{A50EC660-24D0-43A0-AE5E-E274115E726B}">
+<ds:datastoreItem xmlns:ds="http://schemas.openxmlformats.org/officeDocument/2006/customXml" ds:itemID="{19E20559-B232-4371-8690-E3D8007EDB82}">
   <ds:schemaRefs>
-    <ds:schemaRef ds:uri="http://purl.org/dc/elements/1.1/"/>
-    <ds:schemaRef ds:uri="http://schemas.microsoft.com/office/2006/metadata/properties"/>
-    <ds:schemaRef ds:uri="http://purl.org/dc/terms/"/>
-    <ds:schemaRef ds:uri="http://schemas.openxmlformats.org/package/2006/metadata/core-properties"/>
-    <ds:schemaRef ds:uri="http://schemas.microsoft.com/office/2006/documentManagement/types"/>
-    <ds:schemaRef ds:uri="http://www.w3.org/XML/1998/namespace"/>
-    <ds:schemaRef ds:uri="http://purl.org/dc/dcmitype/"/>
-    <ds:schemaRef ds:uri="http://schemas.microsoft.com/office/infopath/2007/PartnerControls"/>
+    <ds:schemaRef ds:uri="http://schemas.microsoft.com/sharepoint/v3/contenttype/forms"/>
   </ds:schemaRefs>
 </ds:datastoreItem>
 </file>
</xml_diff>

<commit_message>
Initial update of license slide for ISC.
</commit_message>
<xml_diff>
--- a/license-master.pptx
+++ b/license-master.pptx
@@ -255,7 +255,7 @@
           <a:p>
             <a:fld id="{0B842F42-2CE9-4E35-95C1-410DC08A50B1}" type="datetimeFigureOut">
               <a:rPr lang="en-US" smtClean="0"/>
-              <a:t>4/6/2021</a:t>
+              <a:t>5/21/2021</a:t>
             </a:fld>
             <a:endParaRPr lang="en-US"/>
           </a:p>
@@ -420,7 +420,7 @@
           <a:p>
             <a:fld id="{6F282904-F315-4730-8D91-37D99E141A6F}" type="datetimeFigureOut">
               <a:rPr lang="en-US" smtClean="0"/>
-              <a:t>4/6/2021</a:t>
+              <a:t>5/21/2021</a:t>
             </a:fld>
             <a:endParaRPr lang="en-US"/>
           </a:p>
@@ -1028,7 +1028,7 @@
         </p:blipFill>
         <p:spPr>
           <a:xfrm>
-            <a:off x="360640" y="483164"/>
+            <a:off x="360639" y="483164"/>
             <a:ext cx="2050840" cy="935496"/>
           </a:xfrm>
           <a:prstGeom prst="rect">
@@ -1115,45 +1115,10 @@
       </p:pic>
       <p:pic>
         <p:nvPicPr>
-          <p:cNvPr id="11" name="Picture 10">
+          <p:cNvPr id="8" name="Picture 7" descr="A picture containing shape&#10;&#10;Description automatically generated">
             <a:extLst>
               <a:ext uri="{FF2B5EF4-FFF2-40B4-BE49-F238E27FC236}">
-                <a16:creationId xmlns:a16="http://schemas.microsoft.com/office/drawing/2014/main" id="{FEB516F4-C09A-4E83-A0F1-168C638F25AA}"/>
-              </a:ext>
-            </a:extLst>
-          </p:cNvPr>
-          <p:cNvPicPr>
-            <a:picLocks noChangeAspect="1"/>
-          </p:cNvPicPr>
-          <p:nvPr userDrawn="1"/>
-        </p:nvPicPr>
-        <p:blipFill rotWithShape="1">
-          <a:blip r:embed="rId7">
-            <a:extLst>
-              <a:ext uri="{28A0092B-C50C-407E-A947-70E740481C1C}">
-                <a14:useLocalDpi xmlns:a14="http://schemas.microsoft.com/office/drawing/2010/main" val="0"/>
-              </a:ext>
-            </a:extLst>
-          </a:blip>
-          <a:srcRect r="58932" b="1495"/>
-          <a:stretch/>
-        </p:blipFill>
-        <p:spPr>
-          <a:xfrm rot="10800000">
-            <a:off x="-1" y="1572767"/>
-            <a:ext cx="2852965" cy="4078297"/>
-          </a:xfrm>
-          <a:prstGeom prst="rect">
-            <a:avLst/>
-          </a:prstGeom>
-        </p:spPr>
-      </p:pic>
-      <p:pic>
-        <p:nvPicPr>
-          <p:cNvPr id="10" name="Picture 9" descr="IDEAS_logo.png">
-            <a:extLst>
-              <a:ext uri="{FF2B5EF4-FFF2-40B4-BE49-F238E27FC236}">
-                <a16:creationId xmlns:a16="http://schemas.microsoft.com/office/drawing/2014/main" id="{9DE86E9C-D24A-4552-A542-495444B5B047}"/>
+                <a16:creationId xmlns:a16="http://schemas.microsoft.com/office/drawing/2014/main" id="{C432A180-7341-4E28-8C2B-73F9AB53D13F}"/>
               </a:ext>
             </a:extLst>
           </p:cNvPr>
@@ -1163,10 +1128,10 @@
           <p:nvPr userDrawn="1"/>
         </p:nvPicPr>
         <p:blipFill>
-          <a:blip r:embed="rId8" cstate="print">
+          <a:blip r:embed="rId7">
             <a:extLst>
               <a:ext uri="{28A0092B-C50C-407E-A947-70E740481C1C}">
-                <a14:useLocalDpi xmlns:a14="http://schemas.microsoft.com/office/drawing/2010/main"/>
+                <a14:useLocalDpi xmlns:a14="http://schemas.microsoft.com/office/drawing/2010/main" val="0"/>
               </a:ext>
             </a:extLst>
           </a:blip>
@@ -1176,8 +1141,8 @@
         </p:blipFill>
         <p:spPr>
           <a:xfrm>
-            <a:off x="211056" y="1848659"/>
-            <a:ext cx="2350008" cy="815135"/>
+            <a:off x="331810" y="1848659"/>
+            <a:ext cx="2108499" cy="914400"/>
           </a:xfrm>
           <a:prstGeom prst="rect">
             <a:avLst/>
@@ -1198,6 +1163,604 @@
 </file>
 
 <file path=ppt/slideLayouts/slideLayout2.xml><?xml version="1.0" encoding="utf-8"?>
+<p:sldLayout xmlns:a="http://schemas.openxmlformats.org/drawingml/2006/main" xmlns:r="http://schemas.openxmlformats.org/officeDocument/2006/relationships" xmlns:p="http://schemas.openxmlformats.org/presentationml/2006/main" showMasterSp="0" preserve="1" userDrawn="1">
+  <p:cSld name="8_Title Slide">
+    <p:spTree>
+      <p:nvGrpSpPr>
+        <p:cNvPr id="1" name=""/>
+        <p:cNvGrpSpPr/>
+        <p:nvPr/>
+      </p:nvGrpSpPr>
+      <p:grpSpPr>
+        <a:xfrm>
+          <a:off x="0" y="0"/>
+          <a:ext cx="0" cy="0"/>
+          <a:chOff x="0" y="0"/>
+          <a:chExt cx="0" cy="0"/>
+        </a:xfrm>
+      </p:grpSpPr>
+      <p:sp>
+        <p:nvSpPr>
+          <p:cNvPr id="4" name="Rectangle 3">
+            <a:extLst>
+              <a:ext uri="{FF2B5EF4-FFF2-40B4-BE49-F238E27FC236}">
+                <a16:creationId xmlns:a16="http://schemas.microsoft.com/office/drawing/2014/main" id="{2E2177C6-060C-4445-8C10-ADA6D3CE5F74}"/>
+              </a:ext>
+            </a:extLst>
+          </p:cNvPr>
+          <p:cNvSpPr/>
+          <p:nvPr userDrawn="1"/>
+        </p:nvSpPr>
+        <p:spPr>
+          <a:xfrm>
+            <a:off x="0" y="6186396"/>
+            <a:ext cx="12188825" cy="671604"/>
+          </a:xfrm>
+          <a:prstGeom prst="rect">
+            <a:avLst/>
+          </a:prstGeom>
+          <a:solidFill>
+            <a:schemeClr val="accent1">
+              <a:lumMod val="75000"/>
+            </a:schemeClr>
+          </a:solidFill>
+          <a:ln>
+            <a:noFill/>
+          </a:ln>
+          <a:effectLst/>
+          <a:scene3d>
+            <a:camera prst="orthographicFront">
+              <a:rot lat="0" lon="0" rev="0"/>
+            </a:camera>
+            <a:lightRig rig="threePt" dir="t">
+              <a:rot lat="0" lon="0" rev="1200000"/>
+            </a:lightRig>
+          </a:scene3d>
+          <a:sp3d/>
+        </p:spPr>
+        <p:style>
+          <a:lnRef idx="0">
+            <a:schemeClr val="accent1"/>
+          </a:lnRef>
+          <a:fillRef idx="3">
+            <a:schemeClr val="accent1"/>
+          </a:fillRef>
+          <a:effectRef idx="3">
+            <a:schemeClr val="accent1"/>
+          </a:effectRef>
+          <a:fontRef idx="minor">
+            <a:schemeClr val="lt1"/>
+          </a:fontRef>
+        </p:style>
+        <p:txBody>
+          <a:bodyPr rot="0" spcFirstLastPara="0" vertOverflow="overflow" horzOverflow="overflow" vert="horz" wrap="square" lIns="548640" tIns="45720" rIns="45720" bIns="45720" numCol="1" spcCol="0" rtlCol="0" fromWordArt="0" anchor="ctr" anchorCtr="0" forceAA="0" compatLnSpc="1">
+            <a:prstTxWarp prst="textNoShape">
+              <a:avLst/>
+            </a:prstTxWarp>
+            <a:noAutofit/>
+          </a:bodyPr>
+          <a:lstStyle/>
+          <a:p>
+            <a:pPr algn="l">
+              <a:lnSpc>
+                <a:spcPct val="90000"/>
+              </a:lnSpc>
+            </a:pPr>
+            <a:r>
+              <a:rPr lang="en-US" sz="1600" dirty="0">
+                <a:ln>
+                  <a:noFill/>
+                </a:ln>
+                <a:solidFill>
+                  <a:schemeClr val="bg1"/>
+                </a:solidFill>
+              </a:rPr>
+              <a:t>exascaleproject.org</a:t>
+            </a:r>
+          </a:p>
+        </p:txBody>
+      </p:sp>
+      <p:sp>
+        <p:nvSpPr>
+          <p:cNvPr id="22" name="Rectangle 21"/>
+          <p:cNvSpPr/>
+          <p:nvPr userDrawn="1"/>
+        </p:nvSpPr>
+        <p:spPr>
+          <a:xfrm>
+            <a:off x="8305800" y="5921829"/>
+            <a:ext cx="3883025" cy="936171"/>
+          </a:xfrm>
+          <a:prstGeom prst="rect">
+            <a:avLst/>
+          </a:prstGeom>
+          <a:noFill/>
+          <a:ln>
+            <a:noFill/>
+          </a:ln>
+          <a:effectLst/>
+          <a:scene3d>
+            <a:camera prst="orthographicFront">
+              <a:rot lat="0" lon="0" rev="0"/>
+            </a:camera>
+            <a:lightRig rig="threePt" dir="t">
+              <a:rot lat="0" lon="0" rev="1200000"/>
+            </a:lightRig>
+          </a:scene3d>
+          <a:sp3d/>
+        </p:spPr>
+        <p:style>
+          <a:lnRef idx="0">
+            <a:schemeClr val="accent1"/>
+          </a:lnRef>
+          <a:fillRef idx="3">
+            <a:schemeClr val="accent1"/>
+          </a:fillRef>
+          <a:effectRef idx="3">
+            <a:schemeClr val="accent1"/>
+          </a:effectRef>
+          <a:fontRef idx="minor">
+            <a:schemeClr val="lt1"/>
+          </a:fontRef>
+        </p:style>
+        <p:txBody>
+          <a:bodyPr rot="0" spcFirstLastPara="0" vertOverflow="overflow" horzOverflow="overflow" vert="horz" wrap="square" lIns="45720" tIns="45720" rIns="45720" bIns="45720" numCol="1" spcCol="0" rtlCol="0" fromWordArt="0" anchor="ctr" anchorCtr="0" forceAA="0" compatLnSpc="1">
+            <a:prstTxWarp prst="textNoShape">
+              <a:avLst/>
+            </a:prstTxWarp>
+            <a:noAutofit/>
+          </a:bodyPr>
+          <a:lstStyle/>
+          <a:p>
+            <a:pPr algn="ctr">
+              <a:lnSpc>
+                <a:spcPct val="90000"/>
+              </a:lnSpc>
+            </a:pPr>
+            <a:endParaRPr lang="en-US" dirty="0">
+              <a:solidFill>
+                <a:schemeClr val="tx1"/>
+              </a:solidFill>
+            </a:endParaRPr>
+          </a:p>
+        </p:txBody>
+      </p:sp>
+      <p:sp>
+        <p:nvSpPr>
+          <p:cNvPr id="2" name="Title 1"/>
+          <p:cNvSpPr>
+            <a:spLocks noGrp="1"/>
+          </p:cNvSpPr>
+          <p:nvPr userDrawn="1">
+            <p:ph type="ctrTitle"/>
+          </p:nvPr>
+        </p:nvSpPr>
+        <p:spPr>
+          <a:xfrm>
+            <a:off x="3177633" y="503144"/>
+            <a:ext cx="8292316" cy="1030930"/>
+          </a:xfrm>
+        </p:spPr>
+        <p:txBody>
+          <a:bodyPr anchor="b"/>
+          <a:lstStyle>
+            <a:lvl1pPr algn="l">
+              <a:defRPr sz="3200" b="1">
+                <a:solidFill>
+                  <a:schemeClr val="tx1"/>
+                </a:solidFill>
+                <a:latin typeface="+mn-lt"/>
+              </a:defRPr>
+            </a:lvl1pPr>
+          </a:lstStyle>
+          <a:p>
+            <a:r>
+              <a:rPr lang="en-US"/>
+              <a:t>Click to edit Master title style</a:t>
+            </a:r>
+            <a:endParaRPr lang="en-US" dirty="0"/>
+          </a:p>
+        </p:txBody>
+      </p:sp>
+      <p:sp>
+        <p:nvSpPr>
+          <p:cNvPr id="3" name="Subtitle 2"/>
+          <p:cNvSpPr>
+            <a:spLocks noGrp="1"/>
+          </p:cNvSpPr>
+          <p:nvPr userDrawn="1">
+            <p:ph type="subTitle" idx="1"/>
+          </p:nvPr>
+        </p:nvSpPr>
+        <p:spPr>
+          <a:xfrm>
+            <a:off x="3177632" y="2085962"/>
+            <a:ext cx="8292317" cy="2855300"/>
+          </a:xfrm>
+        </p:spPr>
+        <p:txBody>
+          <a:bodyPr lIns="109728"/>
+          <a:lstStyle>
+            <a:lvl1pPr marL="0" indent="0" algn="l">
+              <a:buNone/>
+              <a:defRPr sz="2400">
+                <a:solidFill>
+                  <a:schemeClr val="tx1"/>
+                </a:solidFill>
+                <a:latin typeface="Arial" panose="020B0604020202020204" pitchFamily="34" charset="0"/>
+                <a:cs typeface="Arial" panose="020B0604020202020204" pitchFamily="34" charset="0"/>
+              </a:defRPr>
+            </a:lvl1pPr>
+            <a:lvl2pPr marL="457200" indent="0" algn="ctr">
+              <a:buNone/>
+              <a:defRPr>
+                <a:solidFill>
+                  <a:schemeClr val="tx1">
+                    <a:tint val="75000"/>
+                  </a:schemeClr>
+                </a:solidFill>
+              </a:defRPr>
+            </a:lvl2pPr>
+            <a:lvl3pPr marL="914400" indent="0" algn="ctr">
+              <a:buNone/>
+              <a:defRPr>
+                <a:solidFill>
+                  <a:schemeClr val="tx1">
+                    <a:tint val="75000"/>
+                  </a:schemeClr>
+                </a:solidFill>
+              </a:defRPr>
+            </a:lvl3pPr>
+            <a:lvl4pPr marL="1371600" indent="0" algn="ctr">
+              <a:buNone/>
+              <a:defRPr>
+                <a:solidFill>
+                  <a:schemeClr val="tx1">
+                    <a:tint val="75000"/>
+                  </a:schemeClr>
+                </a:solidFill>
+              </a:defRPr>
+            </a:lvl4pPr>
+            <a:lvl5pPr marL="1828800" indent="0" algn="ctr">
+              <a:buNone/>
+              <a:defRPr>
+                <a:solidFill>
+                  <a:schemeClr val="tx1">
+                    <a:tint val="75000"/>
+                  </a:schemeClr>
+                </a:solidFill>
+              </a:defRPr>
+            </a:lvl5pPr>
+            <a:lvl6pPr marL="2286000" indent="0" algn="ctr">
+              <a:buNone/>
+              <a:defRPr>
+                <a:solidFill>
+                  <a:schemeClr val="tx1">
+                    <a:tint val="75000"/>
+                  </a:schemeClr>
+                </a:solidFill>
+              </a:defRPr>
+            </a:lvl6pPr>
+            <a:lvl7pPr marL="2743200" indent="0" algn="ctr">
+              <a:buNone/>
+              <a:defRPr>
+                <a:solidFill>
+                  <a:schemeClr val="tx1">
+                    <a:tint val="75000"/>
+                  </a:schemeClr>
+                </a:solidFill>
+              </a:defRPr>
+            </a:lvl7pPr>
+            <a:lvl8pPr marL="3200400" indent="0" algn="ctr">
+              <a:buNone/>
+              <a:defRPr>
+                <a:solidFill>
+                  <a:schemeClr val="tx1">
+                    <a:tint val="75000"/>
+                  </a:schemeClr>
+                </a:solidFill>
+              </a:defRPr>
+            </a:lvl8pPr>
+            <a:lvl9pPr marL="3657600" indent="0" algn="ctr">
+              <a:buNone/>
+              <a:defRPr>
+                <a:solidFill>
+                  <a:schemeClr val="tx1">
+                    <a:tint val="75000"/>
+                  </a:schemeClr>
+                </a:solidFill>
+              </a:defRPr>
+            </a:lvl9pPr>
+          </a:lstStyle>
+          <a:p>
+            <a:r>
+              <a:rPr lang="en-US"/>
+              <a:t>Click to edit Master subtitle style</a:t>
+            </a:r>
+            <a:endParaRPr lang="en-US" dirty="0"/>
+          </a:p>
+        </p:txBody>
+      </p:sp>
+      <p:pic>
+        <p:nvPicPr>
+          <p:cNvPr id="12" name="Picture 11"/>
+          <p:cNvPicPr>
+            <a:picLocks noChangeAspect="1"/>
+          </p:cNvPicPr>
+          <p:nvPr userDrawn="1"/>
+        </p:nvPicPr>
+        <p:blipFill>
+          <a:blip r:embed="rId2" cstate="print">
+            <a:extLst>
+              <a:ext uri="{28A0092B-C50C-407E-A947-70E740481C1C}">
+                <a14:useLocalDpi xmlns:a14="http://schemas.microsoft.com/office/drawing/2010/main" val="0"/>
+              </a:ext>
+            </a:extLst>
+          </a:blip>
+          <a:stretch>
+            <a:fillRect/>
+          </a:stretch>
+        </p:blipFill>
+        <p:spPr>
+          <a:xfrm>
+            <a:off x="362749" y="483164"/>
+            <a:ext cx="2050840" cy="935496"/>
+          </a:xfrm>
+          <a:prstGeom prst="rect">
+            <a:avLst/>
+          </a:prstGeom>
+        </p:spPr>
+      </p:pic>
+      <p:pic>
+        <p:nvPicPr>
+          <p:cNvPr id="16" name="Picture 15"/>
+          <p:cNvPicPr>
+            <a:picLocks noChangeAspect="1"/>
+          </p:cNvPicPr>
+          <p:nvPr userDrawn="1"/>
+        </p:nvPicPr>
+        <p:blipFill>
+          <a:blip r:embed="rId3" cstate="print">
+            <a:extLst>
+              <a:ext uri="{BEBA8EAE-BF5A-486C-A8C5-ECC9F3942E4B}">
+                <a14:imgProps xmlns:a14="http://schemas.microsoft.com/office/drawing/2010/main">
+                  <a14:imgLayer r:embed="rId4">
+                    <a14:imgEffect>
+                      <a14:brightnessContrast bright="100000"/>
+                    </a14:imgEffect>
+                  </a14:imgLayer>
+                </a14:imgProps>
+              </a:ext>
+              <a:ext uri="{28A0092B-C50C-407E-A947-70E740481C1C}">
+                <a14:useLocalDpi xmlns:a14="http://schemas.microsoft.com/office/drawing/2010/main" val="0"/>
+              </a:ext>
+            </a:extLst>
+          </a:blip>
+          <a:stretch>
+            <a:fillRect/>
+          </a:stretch>
+        </p:blipFill>
+        <p:spPr>
+          <a:xfrm>
+            <a:off x="7289921" y="6322747"/>
+            <a:ext cx="2409477" cy="401008"/>
+          </a:xfrm>
+          <a:prstGeom prst="rect">
+            <a:avLst/>
+          </a:prstGeom>
+        </p:spPr>
+      </p:pic>
+      <p:pic>
+        <p:nvPicPr>
+          <p:cNvPr id="17" name="Picture 16"/>
+          <p:cNvPicPr>
+            <a:picLocks noChangeAspect="1"/>
+          </p:cNvPicPr>
+          <p:nvPr userDrawn="1"/>
+        </p:nvPicPr>
+        <p:blipFill rotWithShape="1">
+          <a:blip r:embed="rId5" cstate="print">
+            <a:extLst>
+              <a:ext uri="{BEBA8EAE-BF5A-486C-A8C5-ECC9F3942E4B}">
+                <a14:imgProps xmlns:a14="http://schemas.microsoft.com/office/drawing/2010/main">
+                  <a14:imgLayer r:embed="rId6">
+                    <a14:imgEffect>
+                      <a14:brightnessContrast bright="100000"/>
+                    </a14:imgEffect>
+                  </a14:imgLayer>
+                </a14:imgProps>
+              </a:ext>
+              <a:ext uri="{28A0092B-C50C-407E-A947-70E740481C1C}">
+                <a14:useLocalDpi xmlns:a14="http://schemas.microsoft.com/office/drawing/2010/main" val="0"/>
+              </a:ext>
+            </a:extLst>
+          </a:blip>
+          <a:srcRect b="70693"/>
+          <a:stretch/>
+        </p:blipFill>
+        <p:spPr>
+          <a:xfrm>
+            <a:off x="10204521" y="6307740"/>
+            <a:ext cx="1367541" cy="428915"/>
+          </a:xfrm>
+          <a:prstGeom prst="rect">
+            <a:avLst/>
+          </a:prstGeom>
+        </p:spPr>
+      </p:pic>
+      <p:pic>
+        <p:nvPicPr>
+          <p:cNvPr id="8" name="Picture 7" descr="A picture containing shape&#10;&#10;Description automatically generated">
+            <a:extLst>
+              <a:ext uri="{FF2B5EF4-FFF2-40B4-BE49-F238E27FC236}">
+                <a16:creationId xmlns:a16="http://schemas.microsoft.com/office/drawing/2014/main" id="{C432A180-7341-4E28-8C2B-73F9AB53D13F}"/>
+              </a:ext>
+            </a:extLst>
+          </p:cNvPr>
+          <p:cNvPicPr>
+            <a:picLocks noChangeAspect="1"/>
+          </p:cNvPicPr>
+          <p:nvPr userDrawn="1"/>
+        </p:nvPicPr>
+        <p:blipFill>
+          <a:blip r:embed="rId7">
+            <a:extLst>
+              <a:ext uri="{28A0092B-C50C-407E-A947-70E740481C1C}">
+                <a14:useLocalDpi xmlns:a14="http://schemas.microsoft.com/office/drawing/2010/main" val="0"/>
+              </a:ext>
+            </a:extLst>
+          </a:blip>
+          <a:stretch>
+            <a:fillRect/>
+          </a:stretch>
+        </p:blipFill>
+        <p:spPr>
+          <a:xfrm>
+            <a:off x="333920" y="1848659"/>
+            <a:ext cx="2108499" cy="914400"/>
+          </a:xfrm>
+          <a:prstGeom prst="rect">
+            <a:avLst/>
+          </a:prstGeom>
+        </p:spPr>
+      </p:pic>
+      <p:pic>
+        <p:nvPicPr>
+          <p:cNvPr id="13" name="Picture 2" descr="https://licensebuttons.net/l/by/4.0/88x31.png">
+            <a:extLst>
+              <a:ext uri="{FF2B5EF4-FFF2-40B4-BE49-F238E27FC236}">
+                <a16:creationId xmlns:a16="http://schemas.microsoft.com/office/drawing/2014/main" id="{FAFD7D99-41CA-4FD0-9396-9C5659F22045}"/>
+              </a:ext>
+            </a:extLst>
+          </p:cNvPr>
+          <p:cNvPicPr>
+            <a:picLocks noChangeAspect="1" noChangeArrowheads="1"/>
+          </p:cNvPicPr>
+          <p:nvPr userDrawn="1"/>
+        </p:nvPicPr>
+        <p:blipFill>
+          <a:blip r:embed="rId8">
+            <a:extLst>
+              <a:ext uri="{28A0092B-C50C-407E-A947-70E740481C1C}">
+                <a14:useLocalDpi xmlns:a14="http://schemas.microsoft.com/office/drawing/2010/main" val="0"/>
+              </a:ext>
+            </a:extLst>
+          </a:blip>
+          <a:srcRect/>
+          <a:stretch>
+            <a:fillRect/>
+          </a:stretch>
+        </p:blipFill>
+        <p:spPr bwMode="auto">
+          <a:xfrm>
+            <a:off x="969069" y="5841262"/>
+            <a:ext cx="838200" cy="295275"/>
+          </a:xfrm>
+          <a:prstGeom prst="rect">
+            <a:avLst/>
+          </a:prstGeom>
+          <a:noFill/>
+          <a:extLst>
+            <a:ext uri="{909E8E84-426E-40DD-AFC4-6F175D3DCCD1}">
+              <a14:hiddenFill xmlns:a14="http://schemas.microsoft.com/office/drawing/2010/main">
+                <a:solidFill>
+                  <a:srgbClr val="FFFFFF"/>
+                </a:solidFill>
+              </a14:hiddenFill>
+            </a:ext>
+          </a:extLst>
+        </p:spPr>
+      </p:pic>
+      <p:sp>
+        <p:nvSpPr>
+          <p:cNvPr id="14" name="TextBox 13">
+            <a:extLst>
+              <a:ext uri="{FF2B5EF4-FFF2-40B4-BE49-F238E27FC236}">
+                <a16:creationId xmlns:a16="http://schemas.microsoft.com/office/drawing/2014/main" id="{9D022D1C-99FF-490C-8690-D8081D33C0AF}"/>
+              </a:ext>
+            </a:extLst>
+          </p:cNvPr>
+          <p:cNvSpPr txBox="1"/>
+          <p:nvPr userDrawn="1"/>
+        </p:nvSpPr>
+        <p:spPr>
+          <a:xfrm>
+            <a:off x="1810964" y="5776533"/>
+            <a:ext cx="1171114" cy="424732"/>
+          </a:xfrm>
+          <a:prstGeom prst="rect">
+            <a:avLst/>
+          </a:prstGeom>
+          <a:noFill/>
+        </p:spPr>
+        <p:txBody>
+          <a:bodyPr wrap="square" rtlCol="0">
+            <a:spAutoFit/>
+          </a:bodyPr>
+          <a:lstStyle/>
+          <a:p>
+            <a:pPr algn="ctr">
+              <a:lnSpc>
+                <a:spcPct val="90000"/>
+              </a:lnSpc>
+            </a:pPr>
+            <a:r>
+              <a:rPr lang="en-US" sz="1200" dirty="0"/>
+              <a:t>See slide 2 for license details</a:t>
+            </a:r>
+          </a:p>
+        </p:txBody>
+      </p:sp>
+      <p:pic>
+        <p:nvPicPr>
+          <p:cNvPr id="15" name="Picture 14">
+            <a:extLst>
+              <a:ext uri="{FF2B5EF4-FFF2-40B4-BE49-F238E27FC236}">
+                <a16:creationId xmlns:a16="http://schemas.microsoft.com/office/drawing/2014/main" id="{C554CDC7-44CF-4751-9869-0265C8E01840}"/>
+              </a:ext>
+            </a:extLst>
+          </p:cNvPr>
+          <p:cNvPicPr>
+            <a:picLocks noChangeAspect="1"/>
+          </p:cNvPicPr>
+          <p:nvPr userDrawn="1"/>
+        </p:nvPicPr>
+        <p:blipFill>
+          <a:blip r:embed="rId9" cstate="print">
+            <a:extLst>
+              <a:ext uri="{28A0092B-C50C-407E-A947-70E740481C1C}">
+                <a14:useLocalDpi xmlns:a14="http://schemas.microsoft.com/office/drawing/2010/main" val="0"/>
+              </a:ext>
+            </a:extLst>
+          </a:blip>
+          <a:stretch>
+            <a:fillRect/>
+          </a:stretch>
+        </p:blipFill>
+        <p:spPr>
+          <a:xfrm>
+            <a:off x="333211" y="3189686"/>
+            <a:ext cx="2109916" cy="905256"/>
+          </a:xfrm>
+          <a:prstGeom prst="rect">
+            <a:avLst/>
+          </a:prstGeom>
+        </p:spPr>
+      </p:pic>
+    </p:spTree>
+    <p:extLst>
+      <p:ext uri="{BB962C8B-B14F-4D97-AF65-F5344CB8AC3E}">
+        <p14:creationId xmlns:p14="http://schemas.microsoft.com/office/powerpoint/2010/main" val="451228200"/>
+      </p:ext>
+    </p:extLst>
+  </p:cSld>
+  <p:clrMapOvr>
+    <a:masterClrMapping/>
+  </p:clrMapOvr>
+</p:sldLayout>
+</file>
+
+<file path=ppt/slideLayouts/slideLayout3.xml><?xml version="1.0" encoding="utf-8"?>
 <p:sldLayout xmlns:a="http://schemas.openxmlformats.org/drawingml/2006/main" xmlns:r="http://schemas.openxmlformats.org/officeDocument/2006/relationships" xmlns:p="http://schemas.openxmlformats.org/presentationml/2006/main" type="obj" preserve="1">
   <p:cSld name="Title and Content">
     <p:bg>
@@ -1352,7 +1915,7 @@
 </p:sldLayout>
 </file>
 
-<file path=ppt/slideLayouts/slideLayout3.xml><?xml version="1.0" encoding="utf-8"?>
+<file path=ppt/slideLayouts/slideLayout4.xml><?xml version="1.0" encoding="utf-8"?>
 <p:sldLayout xmlns:a="http://schemas.openxmlformats.org/drawingml/2006/main" xmlns:r="http://schemas.openxmlformats.org/officeDocument/2006/relationships" xmlns:p="http://schemas.openxmlformats.org/presentationml/2006/main" type="twoTxTwoObj" preserve="1">
   <p:cSld name="Comparison">
     <p:spTree>
@@ -1823,7 +2386,7 @@
 </p:sldLayout>
 </file>
 
-<file path=ppt/slideLayouts/slideLayout4.xml><?xml version="1.0" encoding="utf-8"?>
+<file path=ppt/slideLayouts/slideLayout5.xml><?xml version="1.0" encoding="utf-8"?>
 <p:sldLayout xmlns:a="http://schemas.openxmlformats.org/drawingml/2006/main" xmlns:r="http://schemas.openxmlformats.org/officeDocument/2006/relationships" xmlns:p="http://schemas.openxmlformats.org/presentationml/2006/main" preserve="1" userDrawn="1">
   <p:cSld name="quad chart">
     <p:spTree>
@@ -2586,7 +3149,7 @@
 </p:sldLayout>
 </file>
 
-<file path=ppt/slideLayouts/slideLayout5.xml><?xml version="1.0" encoding="utf-8"?>
+<file path=ppt/slideLayouts/slideLayout6.xml><?xml version="1.0" encoding="utf-8"?>
 <p:sldLayout xmlns:a="http://schemas.openxmlformats.org/drawingml/2006/main" xmlns:r="http://schemas.openxmlformats.org/officeDocument/2006/relationships" xmlns:p="http://schemas.openxmlformats.org/presentationml/2006/main" preserve="1" userDrawn="1">
   <p:cSld name="Section divider">
     <p:spTree>
@@ -2644,7 +3207,7 @@
 </p:sldLayout>
 </file>
 
-<file path=ppt/slideLayouts/slideLayout6.xml><?xml version="1.0" encoding="utf-8"?>
+<file path=ppt/slideLayouts/slideLayout7.xml><?xml version="1.0" encoding="utf-8"?>
 <p:sldLayout xmlns:a="http://schemas.openxmlformats.org/drawingml/2006/main" xmlns:r="http://schemas.openxmlformats.org/officeDocument/2006/relationships" xmlns:p="http://schemas.openxmlformats.org/presentationml/2006/main" type="titleOnly" preserve="1">
   <p:cSld name="Title Only">
     <p:spTree>
@@ -2727,48 +3290,6 @@
           <a:chExt cx="0" cy="0"/>
         </a:xfrm>
       </p:grpSpPr>
-      <p:pic>
-        <p:nvPicPr>
-          <p:cNvPr id="14" name="Picture 13">
-            <a:extLst>
-              <a:ext uri="{FF2B5EF4-FFF2-40B4-BE49-F238E27FC236}">
-                <a16:creationId xmlns:a16="http://schemas.microsoft.com/office/drawing/2014/main" id="{ED1C1369-A08C-454A-B0B5-0955BB31B118}"/>
-              </a:ext>
-            </a:extLst>
-          </p:cNvPr>
-          <p:cNvPicPr>
-            <a:picLocks noChangeAspect="1"/>
-          </p:cNvPicPr>
-          <p:nvPr userDrawn="1"/>
-        </p:nvPicPr>
-        <p:blipFill rotWithShape="1">
-          <a:blip r:embed="rId8">
-            <a:extLst>
-              <a:ext uri="{28A0092B-C50C-407E-A947-70E740481C1C}">
-                <a14:useLocalDpi xmlns:a14="http://schemas.microsoft.com/office/drawing/2010/main" val="0"/>
-              </a:ext>
-            </a:extLst>
-          </a:blip>
-          <a:srcRect r="58932" b="1495"/>
-          <a:stretch/>
-        </p:blipFill>
-        <p:spPr>
-          <a:xfrm>
-            <a:off x="9335860" y="0"/>
-            <a:ext cx="2852965" cy="4078297"/>
-          </a:xfrm>
-          <a:prstGeom prst="rect">
-            <a:avLst/>
-          </a:prstGeom>
-          <a:effectLst>
-            <a:outerShdw blurRad="50800" dist="50800" dir="5400000" algn="ctr" rotWithShape="0">
-              <a:srgbClr val="000000">
-                <a:alpha val="0"/>
-              </a:srgbClr>
-            </a:outerShdw>
-          </a:effectLst>
-        </p:spPr>
-      </p:pic>
       <p:sp>
         <p:nvSpPr>
           <p:cNvPr id="1026" name="Title Placeholder 1"/>
@@ -2907,7 +3428,7 @@
         </p:blipFill>
         <p:spPr>
           <a:xfrm>
-            <a:off x="9741160" y="6183517"/>
+            <a:off x="9741160" y="6185919"/>
             <a:ext cx="1971212" cy="533060"/>
           </a:xfrm>
           <a:prstGeom prst="rect">
@@ -3020,10 +3541,10 @@
       </p:sp>
       <p:pic>
         <p:nvPicPr>
-          <p:cNvPr id="10" name="Picture 9" descr="IDEAS_logo.png">
+          <p:cNvPr id="3" name="Picture 2" descr="A picture containing shape&#10;&#10;Description automatically generated">
             <a:extLst>
               <a:ext uri="{FF2B5EF4-FFF2-40B4-BE49-F238E27FC236}">
-                <a16:creationId xmlns:a16="http://schemas.microsoft.com/office/drawing/2014/main" id="{B8E2FEED-84DC-4438-B439-E3DA7A28736A}"/>
+                <a16:creationId xmlns:a16="http://schemas.microsoft.com/office/drawing/2014/main" id="{2A4943B8-0F89-4A94-B130-A128F45E57C4}"/>
               </a:ext>
             </a:extLst>
           </p:cNvPr>
@@ -3033,10 +3554,10 @@
           <p:nvPr userDrawn="1"/>
         </p:nvPicPr>
         <p:blipFill>
-          <a:blip r:embed="rId10" cstate="print">
+          <a:blip r:embed="rId10">
             <a:extLst>
               <a:ext uri="{28A0092B-C50C-407E-A947-70E740481C1C}">
-                <a14:useLocalDpi xmlns:a14="http://schemas.microsoft.com/office/drawing/2010/main"/>
+                <a14:useLocalDpi xmlns:a14="http://schemas.microsoft.com/office/drawing/2010/main" val="0"/>
               </a:ext>
             </a:extLst>
           </a:blip>
@@ -3046,8 +3567,8 @@
         </p:blipFill>
         <p:spPr>
           <a:xfrm>
-            <a:off x="7663530" y="6156960"/>
-            <a:ext cx="1845330" cy="640080"/>
+            <a:off x="7806050" y="6114121"/>
+            <a:ext cx="1560289" cy="676656"/>
           </a:xfrm>
           <a:prstGeom prst="rect">
             <a:avLst/>
@@ -3064,11 +3585,12 @@
   <p:clrMap bg1="lt1" tx1="dk1" bg2="lt2" tx2="dk2" accent1="accent1" accent2="accent2" accent3="accent3" accent4="accent4" accent5="accent5" accent6="accent6" hlink="hlink" folHlink="folHlink"/>
   <p:sldLayoutIdLst>
     <p:sldLayoutId id="2147483949" r:id="rId1"/>
-    <p:sldLayoutId id="2147483937" r:id="rId2"/>
-    <p:sldLayoutId id="2147483939" r:id="rId3"/>
-    <p:sldLayoutId id="2147483950" r:id="rId4"/>
-    <p:sldLayoutId id="2147483940" r:id="rId5"/>
-    <p:sldLayoutId id="2147483941" r:id="rId6"/>
+    <p:sldLayoutId id="2147483951" r:id="rId2"/>
+    <p:sldLayoutId id="2147483937" r:id="rId3"/>
+    <p:sldLayoutId id="2147483939" r:id="rId4"/>
+    <p:sldLayoutId id="2147483950" r:id="rId5"/>
+    <p:sldLayoutId id="2147483940" r:id="rId6"/>
+    <p:sldLayoutId id="2147483941" r:id="rId7"/>
   </p:sldLayoutIdLst>
   <p:hf hdr="0" ftr="0" dt="0"/>
   <p:txStyles>
@@ -3629,29 +4151,13 @@
             </a:pPr>
             <a:r>
               <a:rPr lang="en-US" sz="1600" b="1" dirty="0"/>
-              <a:t>The requested citation the overall tutorial is: David E. Bernholdt, Patricia A. Grubel, and James M. </a:t>
-            </a:r>
-            <a:r>
-              <a:rPr lang="en-US" sz="1600" b="1" dirty="0" err="1"/>
-              <a:t>Willenbring</a:t>
-            </a:r>
-            <a:r>
-              <a:rPr lang="en-US" sz="1600" b="1" dirty="0"/>
-              <a:t>, Developing a Testing and Continuous Integration Strategy for your Team tutorial, in </a:t>
-            </a:r>
-            <a:r>
-              <a:rPr lang="en-US" sz="1600" b="1" dirty="0" err="1"/>
-              <a:t>Exascale</a:t>
-            </a:r>
-            <a:r>
-              <a:rPr lang="en-US" sz="1600" b="1" dirty="0"/>
-              <a:t> Computing Project Annual Meeting, online, 2021. DOI: </a:t>
+              <a:t>The requested citation the overall tutorial is: David E. Bernholdt, Anshu Dubey, Patricia A. Grubel, Rinku K. Gupta, and David M. Rogers, Better Scientific Software tutorial, in ISC High Performance, online, 2021. DOI: </a:t>
             </a:r>
             <a:r>
               <a:rPr lang="en-US" sz="1600" b="1" dirty="0">
                 <a:hlinkClick r:id="rId4"/>
               </a:rPr>
-              <a:t>10.6084/m9.figshare.14376956</a:t>
+              <a:t>10.6084/m9.figshare.14642520</a:t>
             </a:r>
             <a:endParaRPr lang="en-US" sz="1600" b="1" dirty="0"/>
           </a:p>
@@ -3828,8 +4334,8 @@
         </p:blipFill>
         <p:spPr bwMode="auto">
           <a:xfrm>
-            <a:off x="10249254" y="570111"/>
-            <a:ext cx="1661258" cy="585216"/>
+            <a:off x="10230336" y="879673"/>
+            <a:ext cx="838200" cy="295275"/>
           </a:xfrm>
           <a:prstGeom prst="rect">
             <a:avLst/>
@@ -4772,9 +5278,12 @@
 </file>
 
 <file path=customXml/item1.xml><?xml version="1.0" encoding="utf-8"?>
-<p:properties xmlns:p="http://schemas.microsoft.com/office/2006/metadata/properties" xmlns:xsi="http://www.w3.org/2001/XMLSchema-instance" xmlns:pc="http://schemas.microsoft.com/office/infopath/2007/PartnerControls">
-  <documentManagement/>
-</p:properties>
+<?mso-contentType ?>
+<FormTemplates xmlns="http://schemas.microsoft.com/sharepoint/v3/contenttype/forms">
+  <Display>DocumentLibraryForm</Display>
+  <Edit>DocumentLibraryForm</Edit>
+  <New>DocumentLibraryForm</New>
+</FormTemplates>
 </file>
 
 <file path=customXml/item2.xml><?xml version="1.0" encoding="utf-8"?>
@@ -4827,25 +5336,15 @@
 </file>
 
 <file path=customXml/item3.xml><?xml version="1.0" encoding="utf-8"?>
-<?mso-contentType ?>
-<FormTemplates xmlns="http://schemas.microsoft.com/sharepoint/v3/contenttype/forms">
-  <Display>DocumentLibraryForm</Display>
-  <Edit>DocumentLibraryForm</Edit>
-  <New>DocumentLibraryForm</New>
-</FormTemplates>
+<p:properties xmlns:p="http://schemas.microsoft.com/office/2006/metadata/properties" xmlns:xsi="http://www.w3.org/2001/XMLSchema-instance" xmlns:pc="http://schemas.microsoft.com/office/infopath/2007/PartnerControls">
+  <documentManagement/>
+</p:properties>
 </file>
 
 <file path=customXml/itemProps1.xml><?xml version="1.0" encoding="utf-8"?>
-<ds:datastoreItem xmlns:ds="http://schemas.openxmlformats.org/officeDocument/2006/customXml" ds:itemID="{A50EC660-24D0-43A0-AE5E-E274115E726B}">
+<ds:datastoreItem xmlns:ds="http://schemas.openxmlformats.org/officeDocument/2006/customXml" ds:itemID="{19E20559-B232-4371-8690-E3D8007EDB82}">
   <ds:schemaRefs>
-    <ds:schemaRef ds:uri="http://purl.org/dc/elements/1.1/"/>
-    <ds:schemaRef ds:uri="http://schemas.microsoft.com/office/2006/metadata/properties"/>
-    <ds:schemaRef ds:uri="http://purl.org/dc/terms/"/>
-    <ds:schemaRef ds:uri="http://schemas.openxmlformats.org/package/2006/metadata/core-properties"/>
-    <ds:schemaRef ds:uri="http://schemas.microsoft.com/office/2006/documentManagement/types"/>
-    <ds:schemaRef ds:uri="http://www.w3.org/XML/1998/namespace"/>
-    <ds:schemaRef ds:uri="http://purl.org/dc/dcmitype/"/>
-    <ds:schemaRef ds:uri="http://schemas.microsoft.com/office/infopath/2007/PartnerControls"/>
+    <ds:schemaRef ds:uri="http://schemas.microsoft.com/sharepoint/v3/contenttype/forms"/>
   </ds:schemaRefs>
 </ds:datastoreItem>
 </file>
@@ -4866,9 +5365,16 @@
 </file>
 
 <file path=customXml/itemProps3.xml><?xml version="1.0" encoding="utf-8"?>
-<ds:datastoreItem xmlns:ds="http://schemas.openxmlformats.org/officeDocument/2006/customXml" ds:itemID="{19E20559-B232-4371-8690-E3D8007EDB82}">
+<ds:datastoreItem xmlns:ds="http://schemas.openxmlformats.org/officeDocument/2006/customXml" ds:itemID="{A50EC660-24D0-43A0-AE5E-E274115E726B}">
   <ds:schemaRefs>
-    <ds:schemaRef ds:uri="http://schemas.microsoft.com/sharepoint/v3/contenttype/forms"/>
+    <ds:schemaRef ds:uri="http://purl.org/dc/elements/1.1/"/>
+    <ds:schemaRef ds:uri="http://schemas.microsoft.com/office/2006/metadata/properties"/>
+    <ds:schemaRef ds:uri="http://purl.org/dc/terms/"/>
+    <ds:schemaRef ds:uri="http://schemas.openxmlformats.org/package/2006/metadata/core-properties"/>
+    <ds:schemaRef ds:uri="http://schemas.microsoft.com/office/2006/documentManagement/types"/>
+    <ds:schemaRef ds:uri="http://www.w3.org/XML/1998/namespace"/>
+    <ds:schemaRef ds:uri="http://purl.org/dc/dcmitype/"/>
+    <ds:schemaRef ds:uri="http://schemas.microsoft.com/office/infopath/2007/PartnerControls"/>
   </ds:schemaRefs>
 </ds:datastoreItem>
 </file>
</xml_diff>

<commit_message>
Capture ATPESC DOI and citation
</commit_message>
<xml_diff>
--- a/license-master.pptx
+++ b/license-master.pptx
@@ -255,7 +255,7 @@
           <a:p>
             <a:fld id="{0B842F42-2CE9-4E35-95C1-410DC08A50B1}" type="datetimeFigureOut">
               <a:rPr lang="en-US" smtClean="0"/>
-              <a:t>5/17/22</a:t>
+              <a:t>8/1/2022</a:t>
             </a:fld>
             <a:endParaRPr lang="en-US"/>
           </a:p>
@@ -420,7 +420,7 @@
           <a:p>
             <a:fld id="{6F282904-F315-4730-8D91-37D99E141A6F}" type="datetimeFigureOut">
               <a:rPr lang="en-US" smtClean="0"/>
-              <a:t>5/17/22</a:t>
+              <a:t>8/1/2022</a:t>
             </a:fld>
             <a:endParaRPr lang="en-US"/>
           </a:p>
@@ -4151,15 +4151,25 @@
             </a:pPr>
             <a:r>
               <a:rPr lang="en-US" sz="1600" b="1" dirty="0"/>
-              <a:t>The requested citation the overall tutorial is: </a:t>
+              <a:t>The requested citation the overall tutorial is: David E. Bernholdt, Anshu Dubey, Todd Gamblin, Jared O’Neal, and </a:t>
             </a:r>
             <a:r>
               <a:rPr lang="en-US" sz="1600" b="1" dirty="0" err="1"/>
-              <a:t>Anshu</a:t>
+              <a:t>Boyana</a:t>
             </a:r>
             <a:r>
               <a:rPr lang="en-US" sz="1600" b="1" dirty="0"/>
-              <a:t> Dubey and Gregory R. Watson, Better Scientific Software Tutorial, in ISC High Performance, 2022, Hamburg Germany. DOI: 10.6084/m9.figshare.19781752</a:t>
+              <a:t> R. Norris, Software Productivity and Sustainability track, in Argonne Training Program on Extreme-Scale Computing, Q-Center, St. Charles, Illinois, 2022. DOI: </a:t>
+            </a:r>
+            <a:r>
+              <a:rPr lang="en-US" sz="1600" b="1" dirty="0">
+                <a:hlinkClick r:id="rId4"/>
+              </a:rPr>
+              <a:t>10.6084/m9.figshare.20416215</a:t>
+            </a:r>
+            <a:r>
+              <a:rPr lang="en-US" sz="1600" b="1" dirty="0"/>
+              <a:t>.</a:t>
             </a:r>
           </a:p>
           <a:p>
@@ -4201,15 +4211,7 @@
             </a:pPr>
             <a:r>
               <a:rPr lang="en-US" sz="1400" dirty="0"/>
-              <a:t>This work was supported by the U.S. Department of Energy Office of Science, Office of Advanced Scientific Computing Research (ASCR), and by the </a:t>
-            </a:r>
-            <a:r>
-              <a:rPr lang="en-US" sz="1400" dirty="0" err="1"/>
-              <a:t>Exascale</a:t>
-            </a:r>
-            <a:r>
-              <a:rPr lang="en-US" sz="1400" dirty="0"/>
-              <a:t> Computing Project (17-SC-20-SC), a collaborative effort of the U.S. Department of Energy Office of Science and the National Nuclear Security Administration</a:t>
+              <a:t>This work was supported by the U.S. Department of Energy Office of Science, Office of Advanced Scientific Computing Research (ASCR), and by the Exascale Computing Project (17-SC-20-SC), a collaborative effort of the U.S. Department of Energy Office of Science and the National Nuclear Security Administration</a:t>
             </a:r>
             <a:r>
               <a:rPr lang="en-US" sz="1400" i="1" dirty="0"/>
@@ -4225,15 +4227,7 @@
             </a:pPr>
             <a:r>
               <a:rPr lang="en-US" sz="1400" dirty="0"/>
-              <a:t>This work was performed in part at the Argonne National Laboratory, which is managed by </a:t>
-            </a:r>
-            <a:r>
-              <a:rPr lang="en-US" sz="1400" dirty="0" err="1"/>
-              <a:t>UChicago</a:t>
-            </a:r>
-            <a:r>
-              <a:rPr lang="en-US" sz="1400" dirty="0"/>
-              <a:t> Argonne, LLC for the U.S. Department of Energy under Contract No. DE-AC02-06CH11357.</a:t>
+              <a:t>This work was performed in part at the Argonne National Laboratory, which is managed by UChicago Argonne, LLC for the U.S. Department of Energy under Contract No. DE-AC02-06CH11357.</a:t>
             </a:r>
           </a:p>
           <a:p>
@@ -4297,7 +4291,7 @@
           <p:nvPr/>
         </p:nvPicPr>
         <p:blipFill>
-          <a:blip r:embed="rId4">
+          <a:blip r:embed="rId5">
             <a:extLst>
               <a:ext uri="{28A0092B-C50C-407E-A947-70E740481C1C}">
                 <a14:useLocalDpi xmlns:a14="http://schemas.microsoft.com/office/drawing/2010/main" val="0"/>
@@ -5255,9 +5249,12 @@
 </file>
 
 <file path=customXml/item1.xml><?xml version="1.0" encoding="utf-8"?>
-<p:properties xmlns:p="http://schemas.microsoft.com/office/2006/metadata/properties" xmlns:xsi="http://www.w3.org/2001/XMLSchema-instance" xmlns:pc="http://schemas.microsoft.com/office/infopath/2007/PartnerControls">
-  <documentManagement/>
-</p:properties>
+<?mso-contentType ?>
+<FormTemplates xmlns="http://schemas.microsoft.com/sharepoint/v3/contenttype/forms">
+  <Display>DocumentLibraryForm</Display>
+  <Edit>DocumentLibraryForm</Edit>
+  <New>DocumentLibraryForm</New>
+</FormTemplates>
 </file>
 
 <file path=customXml/item2.xml><?xml version="1.0" encoding="utf-8"?>
@@ -5310,25 +5307,15 @@
 </file>
 
 <file path=customXml/item3.xml><?xml version="1.0" encoding="utf-8"?>
-<?mso-contentType ?>
-<FormTemplates xmlns="http://schemas.microsoft.com/sharepoint/v3/contenttype/forms">
-  <Display>DocumentLibraryForm</Display>
-  <Edit>DocumentLibraryForm</Edit>
-  <New>DocumentLibraryForm</New>
-</FormTemplates>
+<p:properties xmlns:p="http://schemas.microsoft.com/office/2006/metadata/properties" xmlns:xsi="http://www.w3.org/2001/XMLSchema-instance" xmlns:pc="http://schemas.microsoft.com/office/infopath/2007/PartnerControls">
+  <documentManagement/>
+</p:properties>
 </file>
 
 <file path=customXml/itemProps1.xml><?xml version="1.0" encoding="utf-8"?>
-<ds:datastoreItem xmlns:ds="http://schemas.openxmlformats.org/officeDocument/2006/customXml" ds:itemID="{A50EC660-24D0-43A0-AE5E-E274115E726B}">
+<ds:datastoreItem xmlns:ds="http://schemas.openxmlformats.org/officeDocument/2006/customXml" ds:itemID="{19E20559-B232-4371-8690-E3D8007EDB82}">
   <ds:schemaRefs>
-    <ds:schemaRef ds:uri="http://purl.org/dc/elements/1.1/"/>
-    <ds:schemaRef ds:uri="http://schemas.microsoft.com/office/2006/metadata/properties"/>
-    <ds:schemaRef ds:uri="http://purl.org/dc/terms/"/>
-    <ds:schemaRef ds:uri="http://schemas.openxmlformats.org/package/2006/metadata/core-properties"/>
-    <ds:schemaRef ds:uri="http://schemas.microsoft.com/office/2006/documentManagement/types"/>
-    <ds:schemaRef ds:uri="http://www.w3.org/XML/1998/namespace"/>
-    <ds:schemaRef ds:uri="http://purl.org/dc/dcmitype/"/>
-    <ds:schemaRef ds:uri="http://schemas.microsoft.com/office/infopath/2007/PartnerControls"/>
+    <ds:schemaRef ds:uri="http://schemas.microsoft.com/sharepoint/v3/contenttype/forms"/>
   </ds:schemaRefs>
 </ds:datastoreItem>
 </file>
@@ -5349,9 +5336,16 @@
 </file>
 
 <file path=customXml/itemProps3.xml><?xml version="1.0" encoding="utf-8"?>
-<ds:datastoreItem xmlns:ds="http://schemas.openxmlformats.org/officeDocument/2006/customXml" ds:itemID="{19E20559-B232-4371-8690-E3D8007EDB82}">
+<ds:datastoreItem xmlns:ds="http://schemas.openxmlformats.org/officeDocument/2006/customXml" ds:itemID="{A50EC660-24D0-43A0-AE5E-E274115E726B}">
   <ds:schemaRefs>
-    <ds:schemaRef ds:uri="http://schemas.microsoft.com/sharepoint/v3/contenttype/forms"/>
+    <ds:schemaRef ds:uri="http://purl.org/dc/elements/1.1/"/>
+    <ds:schemaRef ds:uri="http://schemas.microsoft.com/office/2006/metadata/properties"/>
+    <ds:schemaRef ds:uri="http://purl.org/dc/terms/"/>
+    <ds:schemaRef ds:uri="http://schemas.openxmlformats.org/package/2006/metadata/core-properties"/>
+    <ds:schemaRef ds:uri="http://schemas.microsoft.com/office/2006/documentManagement/types"/>
+    <ds:schemaRef ds:uri="http://www.w3.org/XML/1998/namespace"/>
+    <ds:schemaRef ds:uri="http://purl.org/dc/dcmitype/"/>
+    <ds:schemaRef ds:uri="http://schemas.microsoft.com/office/infopath/2007/PartnerControls"/>
   </ds:schemaRefs>
 </ds:datastoreItem>
 </file>
</xml_diff>

<commit_message>
Begin preparing for ACM-REP tutorial
</commit_message>
<xml_diff>
--- a/license-master.pptx
+++ b/license-master.pptx
@@ -255,7 +255,7 @@
           <a:p>
             <a:fld id="{0B842F42-2CE9-4E35-95C1-410DC08A50B1}" type="datetimeFigureOut">
               <a:rPr lang="en-US" smtClean="0"/>
-              <a:t>4/24/2024</a:t>
+              <a:t>6/11/2024</a:t>
             </a:fld>
             <a:endParaRPr lang="en-US"/>
           </a:p>
@@ -420,7 +420,7 @@
           <a:p>
             <a:fld id="{6F282904-F315-4730-8D91-37D99E141A6F}" type="datetimeFigureOut">
               <a:rPr lang="en-US" smtClean="0"/>
-              <a:t>4/24/2024</a:t>
+              <a:t>6/11/2024</a:t>
             </a:fld>
             <a:endParaRPr lang="en-US"/>
           </a:p>
@@ -3406,36 +3406,6 @@
           </a:p>
         </p:txBody>
       </p:sp>
-      <p:pic>
-        <p:nvPicPr>
-          <p:cNvPr id="13" name="Picture 12"/>
-          <p:cNvPicPr>
-            <a:picLocks noChangeAspect="1"/>
-          </p:cNvPicPr>
-          <p:nvPr userDrawn="1"/>
-        </p:nvPicPr>
-        <p:blipFill>
-          <a:blip r:embed="rId9" cstate="print">
-            <a:extLst>
-              <a:ext uri="{28A0092B-C50C-407E-A947-70E740481C1C}">
-                <a14:useLocalDpi xmlns:a14="http://schemas.microsoft.com/office/drawing/2010/main" val="0"/>
-              </a:ext>
-            </a:extLst>
-          </a:blip>
-          <a:stretch>
-            <a:fillRect/>
-          </a:stretch>
-        </p:blipFill>
-        <p:spPr>
-          <a:xfrm>
-            <a:off x="9741160" y="6185919"/>
-            <a:ext cx="1971212" cy="533060"/>
-          </a:xfrm>
-          <a:prstGeom prst="rect">
-            <a:avLst/>
-          </a:prstGeom>
-        </p:spPr>
-      </p:pic>
       <p:sp>
         <p:nvSpPr>
           <p:cNvPr id="8" name="Rectangle 256"/>
@@ -3539,42 +3509,6 @@
           </a:p>
         </p:txBody>
       </p:sp>
-      <p:pic>
-        <p:nvPicPr>
-          <p:cNvPr id="3" name="Picture 2" descr="A picture containing shape&#10;&#10;Description automatically generated">
-            <a:extLst>
-              <a:ext uri="{FF2B5EF4-FFF2-40B4-BE49-F238E27FC236}">
-                <a16:creationId xmlns:a16="http://schemas.microsoft.com/office/drawing/2014/main" id="{2A4943B8-0F89-4A94-B130-A128F45E57C4}"/>
-              </a:ext>
-            </a:extLst>
-          </p:cNvPr>
-          <p:cNvPicPr>
-            <a:picLocks noChangeAspect="1"/>
-          </p:cNvPicPr>
-          <p:nvPr userDrawn="1"/>
-        </p:nvPicPr>
-        <p:blipFill>
-          <a:blip r:embed="rId10">
-            <a:extLst>
-              <a:ext uri="{28A0092B-C50C-407E-A947-70E740481C1C}">
-                <a14:useLocalDpi xmlns:a14="http://schemas.microsoft.com/office/drawing/2010/main" val="0"/>
-              </a:ext>
-            </a:extLst>
-          </a:blip>
-          <a:stretch>
-            <a:fillRect/>
-          </a:stretch>
-        </p:blipFill>
-        <p:spPr>
-          <a:xfrm>
-            <a:off x="7806050" y="6114121"/>
-            <a:ext cx="1560289" cy="676656"/>
-          </a:xfrm>
-          <a:prstGeom prst="rect">
-            <a:avLst/>
-          </a:prstGeom>
-        </p:spPr>
-      </p:pic>
     </p:spTree>
     <p:extLst>
       <p:ext uri="{BB962C8B-B14F-4D97-AF65-F5344CB8AC3E}">
@@ -4154,36 +4088,26 @@
               <a:t>The requested citation the overall tutorial is: </a:t>
             </a:r>
             <a:r>
-              <a:rPr lang="en-US" sz="1600" b="0" i="0" dirty="0">
-                <a:solidFill>
-                  <a:srgbClr val="111111"/>
-                </a:solidFill>
-                <a:effectLst/>
-                <a:latin typeface="+mn-lt"/>
-              </a:rPr>
-              <a:t>Anshu Dubey, Better Scientific Software tutorial, in ISC High Performance (ISC24), Hamburg, Germany, and online, 2024. DOI: </a:t>
-            </a:r>
-            <a:r>
-              <a:rPr lang="en-US" sz="1600" b="0" i="0" u="none" strike="noStrike" dirty="0">
-                <a:solidFill>
-                  <a:srgbClr val="2A7AE2"/>
-                </a:solidFill>
-                <a:effectLst/>
-                <a:latin typeface="+mn-lt"/>
+              <a:rPr lang="en-US" sz="1600" dirty="0"/>
+              <a:t>Anshu Dubey and Gregory R. Watson, Software Practices for Reproducible Science tutorial, in 2024 ACM Conference on Reproducibility and Replicability (ACM-REP), Rennes, France and online, 2024. DOI: </a:t>
+            </a:r>
+            <a:r>
+              <a:rPr lang="en-US" sz="1600" dirty="0">
                 <a:hlinkClick r:id="rId4"/>
               </a:rPr>
-              <a:t>10.6084/m9.figshare.25686426</a:t>
-            </a:r>
-            <a:r>
-              <a:rPr lang="en-US" sz="1600" b="0" i="0" dirty="0">
-                <a:solidFill>
-                  <a:srgbClr val="111111"/>
-                </a:solidFill>
-                <a:effectLst/>
-                <a:latin typeface="+mn-lt"/>
-              </a:rPr>
+              <a:t>10.6084/m9.figshare.26019469</a:t>
+            </a:r>
+            <a:r>
+              <a:rPr lang="en-US" sz="1600" b="1" dirty="0"/>
               <a:t>.</a:t>
             </a:r>
+            <a:endParaRPr lang="en-US" sz="1600" b="0" i="0" dirty="0">
+              <a:solidFill>
+                <a:srgbClr val="111111"/>
+              </a:solidFill>
+              <a:effectLst/>
+              <a:latin typeface="+mn-lt"/>
+            </a:endParaRPr>
           </a:p>
           <a:p>
             <a:pPr>
@@ -5289,21 +5213,6 @@
 </file>
 
 <file path=customXml/item1.xml><?xml version="1.0" encoding="utf-8"?>
-<?mso-contentType ?>
-<FormTemplates xmlns="http://schemas.microsoft.com/sharepoint/v3/contenttype/forms">
-  <Display>DocumentLibraryForm</Display>
-  <Edit>DocumentLibraryForm</Edit>
-  <New>DocumentLibraryForm</New>
-</FormTemplates>
-</file>
-
-<file path=customXml/item2.xml><?xml version="1.0" encoding="utf-8"?>
-<p:properties xmlns:p="http://schemas.microsoft.com/office/2006/metadata/properties" xmlns:xsi="http://www.w3.org/2001/XMLSchema-instance" xmlns:pc="http://schemas.microsoft.com/office/infopath/2007/PartnerControls">
-  <documentManagement/>
-</p:properties>
-</file>
-
-<file path=customXml/item3.xml><?xml version="1.0" encoding="utf-8"?>
 <ct:contentTypeSchema xmlns:ct="http://schemas.microsoft.com/office/2006/metadata/contentType" xmlns:ma="http://schemas.microsoft.com/office/2006/metadata/properties/metaAttributes" ct:_="" ma:_="" ma:contentTypeName="Document" ma:contentTypeID="0x010100565464437F680748A68B85EB6594EA7D" ma:contentTypeVersion="0" ma:contentTypeDescription="Create a new document." ma:contentTypeScope="" ma:versionID="fe3f4dd58d5914c51cfc6deaa8ad845c">
   <xsd:schema xmlns:xsd="http://www.w3.org/2001/XMLSchema" xmlns:p="http://schemas.microsoft.com/office/2006/metadata/properties" targetNamespace="http://schemas.microsoft.com/office/2006/metadata/properties" ma:root="true" ma:fieldsID="4aeb20c0e3442673af7ee10786458764">
     <xsd:element name="properties">
@@ -5352,10 +5261,32 @@
 </ct:contentTypeSchema>
 </file>
 
+<file path=customXml/item2.xml><?xml version="1.0" encoding="utf-8"?>
+<p:properties xmlns:p="http://schemas.microsoft.com/office/2006/metadata/properties" xmlns:xsi="http://www.w3.org/2001/XMLSchema-instance" xmlns:pc="http://schemas.microsoft.com/office/infopath/2007/PartnerControls">
+  <documentManagement/>
+</p:properties>
+</file>
+
+<file path=customXml/item3.xml><?xml version="1.0" encoding="utf-8"?>
+<?mso-contentType ?>
+<FormTemplates xmlns="http://schemas.microsoft.com/sharepoint/v3/contenttype/forms">
+  <Display>DocumentLibraryForm</Display>
+  <Edit>DocumentLibraryForm</Edit>
+  <New>DocumentLibraryForm</New>
+</FormTemplates>
+</file>
+
 <file path=customXml/itemProps1.xml><?xml version="1.0" encoding="utf-8"?>
-<ds:datastoreItem xmlns:ds="http://schemas.openxmlformats.org/officeDocument/2006/customXml" ds:itemID="{19E20559-B232-4371-8690-E3D8007EDB82}">
+<ds:datastoreItem xmlns:ds="http://schemas.openxmlformats.org/officeDocument/2006/customXml" ds:itemID="{E8DB7DEB-074E-4EE8-9B6E-FD277323109C}">
   <ds:schemaRefs>
-    <ds:schemaRef ds:uri="http://schemas.microsoft.com/sharepoint/v3/contenttype/forms"/>
+    <ds:schemaRef ds:uri="http://schemas.microsoft.com/office/2006/metadata/contentType"/>
+    <ds:schemaRef ds:uri="http://schemas.microsoft.com/office/2006/metadata/properties/metaAttributes"/>
+    <ds:schemaRef ds:uri="http://www.w3.org/2001/XMLSchema"/>
+    <ds:schemaRef ds:uri="http://schemas.microsoft.com/office/2006/metadata/properties"/>
+    <ds:schemaRef ds:uri="http://schemas.openxmlformats.org/package/2006/metadata/core-properties"/>
+    <ds:schemaRef ds:uri="http://purl.org/dc/elements/1.1/"/>
+    <ds:schemaRef ds:uri="http://purl.org/dc/terms/"/>
+    <ds:schemaRef ds:uri="http://schemas.microsoft.com/office/internal/2005/internalDocumentation"/>
   </ds:schemaRefs>
 </ds:datastoreItem>
 </file>
@@ -5376,16 +5307,9 @@
 </file>
 
 <file path=customXml/itemProps3.xml><?xml version="1.0" encoding="utf-8"?>
-<ds:datastoreItem xmlns:ds="http://schemas.openxmlformats.org/officeDocument/2006/customXml" ds:itemID="{E8DB7DEB-074E-4EE8-9B6E-FD277323109C}">
+<ds:datastoreItem xmlns:ds="http://schemas.openxmlformats.org/officeDocument/2006/customXml" ds:itemID="{19E20559-B232-4371-8690-E3D8007EDB82}">
   <ds:schemaRefs>
-    <ds:schemaRef ds:uri="http://schemas.microsoft.com/office/2006/metadata/contentType"/>
-    <ds:schemaRef ds:uri="http://schemas.microsoft.com/office/2006/metadata/properties/metaAttributes"/>
-    <ds:schemaRef ds:uri="http://www.w3.org/2001/XMLSchema"/>
-    <ds:schemaRef ds:uri="http://schemas.microsoft.com/office/2006/metadata/properties"/>
-    <ds:schemaRef ds:uri="http://schemas.openxmlformats.org/package/2006/metadata/core-properties"/>
-    <ds:schemaRef ds:uri="http://purl.org/dc/elements/1.1/"/>
-    <ds:schemaRef ds:uri="http://purl.org/dc/terms/"/>
-    <ds:schemaRef ds:uri="http://schemas.microsoft.com/office/internal/2005/internalDocumentation"/>
+    <ds:schemaRef ds:uri="http://schemas.microsoft.com/sharepoint/v3/contenttype/forms"/>
   </ds:schemaRefs>
 </ds:datastoreItem>
 </file>
</xml_diff>

<commit_message>
Record DOI and update license slide for ATPESC
</commit_message>
<xml_diff>
--- a/license-master.pptx
+++ b/license-master.pptx
@@ -255,7 +255,7 @@
           <a:p>
             <a:fld id="{0B842F42-2CE9-4E35-95C1-410DC08A50B1}" type="datetimeFigureOut">
               <a:rPr lang="en-US" smtClean="0"/>
-              <a:t>6/11/2024</a:t>
+              <a:t>7/26/2024</a:t>
             </a:fld>
             <a:endParaRPr lang="en-US"/>
           </a:p>
@@ -420,7 +420,7 @@
           <a:p>
             <a:fld id="{6F282904-F315-4730-8D91-37D99E141A6F}" type="datetimeFigureOut">
               <a:rPr lang="en-US" smtClean="0"/>
-              <a:t>6/11/2024</a:t>
+              <a:t>7/26/2024</a:t>
             </a:fld>
             <a:endParaRPr lang="en-US"/>
           </a:p>
@@ -4089,16 +4089,16 @@
             </a:r>
             <a:r>
               <a:rPr lang="en-US" sz="1600" dirty="0"/>
-              <a:t>Anshu Dubey and Gregory R. Watson, Software Practices for Reproducible Science tutorial, in 2024 ACM Conference on Reproducibility and Replicability (ACM-REP), Rennes, France and online, 2024. DOI: </a:t>
+              <a:t>Anshu Dubey, David E. Bernholdt, Todd Gamblin, and Jared O’Neal, Software Productivity and Sustainability track, in Argonne Training Program on Extreme-Scale Computing, St. Charles, Illinois, 2024. DOI: </a:t>
             </a:r>
             <a:r>
               <a:rPr lang="en-US" sz="1600" dirty="0">
                 <a:hlinkClick r:id="rId4"/>
               </a:rPr>
-              <a:t>10.6084/m9.figshare.26019469</a:t>
-            </a:r>
-            <a:r>
-              <a:rPr lang="en-US" sz="1600" b="1" dirty="0"/>
+              <a:t>10.6084/m9.figshare.26384188</a:t>
+            </a:r>
+            <a:r>
+              <a:rPr lang="en-US" sz="1600" dirty="0"/>
               <a:t>.</a:t>
             </a:r>
             <a:endParaRPr lang="en-US" sz="1600" b="0" i="0" dirty="0">
@@ -5213,6 +5213,21 @@
 </file>
 
 <file path=customXml/item1.xml><?xml version="1.0" encoding="utf-8"?>
+<?mso-contentType ?>
+<FormTemplates xmlns="http://schemas.microsoft.com/sharepoint/v3/contenttype/forms">
+  <Display>DocumentLibraryForm</Display>
+  <Edit>DocumentLibraryForm</Edit>
+  <New>DocumentLibraryForm</New>
+</FormTemplates>
+</file>
+
+<file path=customXml/item2.xml><?xml version="1.0" encoding="utf-8"?>
+<p:properties xmlns:p="http://schemas.microsoft.com/office/2006/metadata/properties" xmlns:xsi="http://www.w3.org/2001/XMLSchema-instance" xmlns:pc="http://schemas.microsoft.com/office/infopath/2007/PartnerControls">
+  <documentManagement/>
+</p:properties>
+</file>
+
+<file path=customXml/item3.xml><?xml version="1.0" encoding="utf-8"?>
 <ct:contentTypeSchema xmlns:ct="http://schemas.microsoft.com/office/2006/metadata/contentType" xmlns:ma="http://schemas.microsoft.com/office/2006/metadata/properties/metaAttributes" ct:_="" ma:_="" ma:contentTypeName="Document" ma:contentTypeID="0x010100565464437F680748A68B85EB6594EA7D" ma:contentTypeVersion="0" ma:contentTypeDescription="Create a new document." ma:contentTypeScope="" ma:versionID="fe3f4dd58d5914c51cfc6deaa8ad845c">
   <xsd:schema xmlns:xsd="http://www.w3.org/2001/XMLSchema" xmlns:p="http://schemas.microsoft.com/office/2006/metadata/properties" targetNamespace="http://schemas.microsoft.com/office/2006/metadata/properties" ma:root="true" ma:fieldsID="4aeb20c0e3442673af7ee10786458764">
     <xsd:element name="properties">
@@ -5261,32 +5276,10 @@
 </ct:contentTypeSchema>
 </file>
 
-<file path=customXml/item2.xml><?xml version="1.0" encoding="utf-8"?>
-<p:properties xmlns:p="http://schemas.microsoft.com/office/2006/metadata/properties" xmlns:xsi="http://www.w3.org/2001/XMLSchema-instance" xmlns:pc="http://schemas.microsoft.com/office/infopath/2007/PartnerControls">
-  <documentManagement/>
-</p:properties>
-</file>
-
-<file path=customXml/item3.xml><?xml version="1.0" encoding="utf-8"?>
-<?mso-contentType ?>
-<FormTemplates xmlns="http://schemas.microsoft.com/sharepoint/v3/contenttype/forms">
-  <Display>DocumentLibraryForm</Display>
-  <Edit>DocumentLibraryForm</Edit>
-  <New>DocumentLibraryForm</New>
-</FormTemplates>
-</file>
-
 <file path=customXml/itemProps1.xml><?xml version="1.0" encoding="utf-8"?>
-<ds:datastoreItem xmlns:ds="http://schemas.openxmlformats.org/officeDocument/2006/customXml" ds:itemID="{E8DB7DEB-074E-4EE8-9B6E-FD277323109C}">
+<ds:datastoreItem xmlns:ds="http://schemas.openxmlformats.org/officeDocument/2006/customXml" ds:itemID="{19E20559-B232-4371-8690-E3D8007EDB82}">
   <ds:schemaRefs>
-    <ds:schemaRef ds:uri="http://schemas.microsoft.com/office/2006/metadata/contentType"/>
-    <ds:schemaRef ds:uri="http://schemas.microsoft.com/office/2006/metadata/properties/metaAttributes"/>
-    <ds:schemaRef ds:uri="http://www.w3.org/2001/XMLSchema"/>
-    <ds:schemaRef ds:uri="http://schemas.microsoft.com/office/2006/metadata/properties"/>
-    <ds:schemaRef ds:uri="http://schemas.openxmlformats.org/package/2006/metadata/core-properties"/>
-    <ds:schemaRef ds:uri="http://purl.org/dc/elements/1.1/"/>
-    <ds:schemaRef ds:uri="http://purl.org/dc/terms/"/>
-    <ds:schemaRef ds:uri="http://schemas.microsoft.com/office/internal/2005/internalDocumentation"/>
+    <ds:schemaRef ds:uri="http://schemas.microsoft.com/sharepoint/v3/contenttype/forms"/>
   </ds:schemaRefs>
 </ds:datastoreItem>
 </file>
@@ -5307,9 +5300,16 @@
 </file>
 
 <file path=customXml/itemProps3.xml><?xml version="1.0" encoding="utf-8"?>
-<ds:datastoreItem xmlns:ds="http://schemas.openxmlformats.org/officeDocument/2006/customXml" ds:itemID="{19E20559-B232-4371-8690-E3D8007EDB82}">
+<ds:datastoreItem xmlns:ds="http://schemas.openxmlformats.org/officeDocument/2006/customXml" ds:itemID="{E8DB7DEB-074E-4EE8-9B6E-FD277323109C}">
   <ds:schemaRefs>
-    <ds:schemaRef ds:uri="http://schemas.microsoft.com/sharepoint/v3/contenttype/forms"/>
+    <ds:schemaRef ds:uri="http://schemas.microsoft.com/office/2006/metadata/contentType"/>
+    <ds:schemaRef ds:uri="http://schemas.microsoft.com/office/2006/metadata/properties/metaAttributes"/>
+    <ds:schemaRef ds:uri="http://www.w3.org/2001/XMLSchema"/>
+    <ds:schemaRef ds:uri="http://schemas.microsoft.com/office/2006/metadata/properties"/>
+    <ds:schemaRef ds:uri="http://schemas.openxmlformats.org/package/2006/metadata/core-properties"/>
+    <ds:schemaRef ds:uri="http://purl.org/dc/elements/1.1/"/>
+    <ds:schemaRef ds:uri="http://purl.org/dc/terms/"/>
+    <ds:schemaRef ds:uri="http://schemas.microsoft.com/office/internal/2005/internalDocumentation"/>
   </ds:schemaRefs>
 </ds:datastoreItem>
 </file>
</xml_diff>